<commit_message>
Added missing .ssh setup
</commit_message>
<xml_diff>
--- a/AutomationSetup.pptx
+++ b/AutomationSetup.pptx
@@ -5,7 +5,7 @@
     <p:sldMasterId id="2147483648" r:id="rId1"/>
   </p:sldMasterIdLst>
   <p:notesMasterIdLst>
-    <p:notesMasterId r:id="rId13"/>
+    <p:notesMasterId r:id="rId14"/>
   </p:notesMasterIdLst>
   <p:sldIdLst>
     <p:sldId id="256" r:id="rId2"/>
@@ -18,7 +18,8 @@
     <p:sldId id="265" r:id="rId9"/>
     <p:sldId id="266" r:id="rId10"/>
     <p:sldId id="267" r:id="rId11"/>
-    <p:sldId id="268" r:id="rId12"/>
+    <p:sldId id="269" r:id="rId12"/>
+    <p:sldId id="268" r:id="rId13"/>
   </p:sldIdLst>
   <p:sldSz cx="9144000" cy="6858000" type="screen4x3"/>
   <p:notesSz cx="6858000" cy="9144000"/>
@@ -202,7 +203,7 @@
           <a:p>
             <a:fld id="{D93C6ADC-BABE-4B99-AE89-C85FD8DD4126}" type="datetimeFigureOut">
               <a:rPr lang="en-GB" smtClean="0"/>
-              <a:t>26/09/2014</a:t>
+              <a:t>30/09/2014</a:t>
             </a:fld>
             <a:endParaRPr lang="en-GB"/>
           </a:p>
@@ -730,7 +731,7 @@
           <a:p>
             <a:fld id="{34634343-A678-4218-A349-B0FA4106C404}" type="datetimeFigureOut">
               <a:rPr lang="en-GB" smtClean="0"/>
-              <a:t>26/09/2014</a:t>
+              <a:t>30/09/2014</a:t>
             </a:fld>
             <a:endParaRPr lang="en-GB"/>
           </a:p>
@@ -900,7 +901,7 @@
           <a:p>
             <a:fld id="{34634343-A678-4218-A349-B0FA4106C404}" type="datetimeFigureOut">
               <a:rPr lang="en-GB" smtClean="0"/>
-              <a:t>26/09/2014</a:t>
+              <a:t>30/09/2014</a:t>
             </a:fld>
             <a:endParaRPr lang="en-GB"/>
           </a:p>
@@ -1080,7 +1081,7 @@
           <a:p>
             <a:fld id="{34634343-A678-4218-A349-B0FA4106C404}" type="datetimeFigureOut">
               <a:rPr lang="en-GB" smtClean="0"/>
-              <a:t>26/09/2014</a:t>
+              <a:t>30/09/2014</a:t>
             </a:fld>
             <a:endParaRPr lang="en-GB"/>
           </a:p>
@@ -1250,7 +1251,7 @@
           <a:p>
             <a:fld id="{34634343-A678-4218-A349-B0FA4106C404}" type="datetimeFigureOut">
               <a:rPr lang="en-GB" smtClean="0"/>
-              <a:t>26/09/2014</a:t>
+              <a:t>30/09/2014</a:t>
             </a:fld>
             <a:endParaRPr lang="en-GB"/>
           </a:p>
@@ -1496,7 +1497,7 @@
           <a:p>
             <a:fld id="{34634343-A678-4218-A349-B0FA4106C404}" type="datetimeFigureOut">
               <a:rPr lang="en-GB" smtClean="0"/>
-              <a:t>26/09/2014</a:t>
+              <a:t>30/09/2014</a:t>
             </a:fld>
             <a:endParaRPr lang="en-GB"/>
           </a:p>
@@ -1784,7 +1785,7 @@
           <a:p>
             <a:fld id="{34634343-A678-4218-A349-B0FA4106C404}" type="datetimeFigureOut">
               <a:rPr lang="en-GB" smtClean="0"/>
-              <a:t>26/09/2014</a:t>
+              <a:t>30/09/2014</a:t>
             </a:fld>
             <a:endParaRPr lang="en-GB"/>
           </a:p>
@@ -2206,7 +2207,7 @@
           <a:p>
             <a:fld id="{34634343-A678-4218-A349-B0FA4106C404}" type="datetimeFigureOut">
               <a:rPr lang="en-GB" smtClean="0"/>
-              <a:t>26/09/2014</a:t>
+              <a:t>30/09/2014</a:t>
             </a:fld>
             <a:endParaRPr lang="en-GB"/>
           </a:p>
@@ -2324,7 +2325,7 @@
           <a:p>
             <a:fld id="{34634343-A678-4218-A349-B0FA4106C404}" type="datetimeFigureOut">
               <a:rPr lang="en-GB" smtClean="0"/>
-              <a:t>26/09/2014</a:t>
+              <a:t>30/09/2014</a:t>
             </a:fld>
             <a:endParaRPr lang="en-GB"/>
           </a:p>
@@ -2419,7 +2420,7 @@
           <a:p>
             <a:fld id="{34634343-A678-4218-A349-B0FA4106C404}" type="datetimeFigureOut">
               <a:rPr lang="en-GB" smtClean="0"/>
-              <a:t>26/09/2014</a:t>
+              <a:t>30/09/2014</a:t>
             </a:fld>
             <a:endParaRPr lang="en-GB"/>
           </a:p>
@@ -2696,7 +2697,7 @@
           <a:p>
             <a:fld id="{34634343-A678-4218-A349-B0FA4106C404}" type="datetimeFigureOut">
               <a:rPr lang="en-GB" smtClean="0"/>
-              <a:t>26/09/2014</a:t>
+              <a:t>30/09/2014</a:t>
             </a:fld>
             <a:endParaRPr lang="en-GB"/>
           </a:p>
@@ -2949,7 +2950,7 @@
           <a:p>
             <a:fld id="{34634343-A678-4218-A349-B0FA4106C404}" type="datetimeFigureOut">
               <a:rPr lang="en-GB" smtClean="0"/>
-              <a:t>26/09/2014</a:t>
+              <a:t>30/09/2014</a:t>
             </a:fld>
             <a:endParaRPr lang="en-GB"/>
           </a:p>
@@ -3162,7 +3163,7 @@
           <a:p>
             <a:fld id="{34634343-A678-4218-A349-B0FA4106C404}" type="datetimeFigureOut">
               <a:rPr lang="en-GB" smtClean="0"/>
-              <a:t>26/09/2014</a:t>
+              <a:t>30/09/2014</a:t>
             </a:fld>
             <a:endParaRPr lang="en-GB"/>
           </a:p>
@@ -4017,7 +4018,15 @@
           <a:p>
             <a:r>
               <a:rPr lang="en-GB" dirty="0" smtClean="0"/>
-              <a:t>GIT Setup – Add files</a:t>
+              <a:t>GIT Setup – </a:t>
+            </a:r>
+            <a:r>
+              <a:rPr lang="en-GB" dirty="0" smtClean="0"/>
+              <a:t>.</a:t>
+            </a:r>
+            <a:r>
+              <a:rPr lang="en-GB" dirty="0" err="1" smtClean="0"/>
+              <a:t>ssh</a:t>
             </a:r>
             <a:endParaRPr lang="en-GB" dirty="0"/>
           </a:p>
@@ -4041,6 +4050,342 @@
         </p:spPr>
         <p:txBody>
           <a:bodyPr>
+            <a:normAutofit/>
+          </a:bodyPr>
+          <a:lstStyle/>
+          <a:p>
+            <a:pPr marL="0" indent="0">
+              <a:buNone/>
+            </a:pPr>
+            <a:endParaRPr lang="en-GB" sz="1050" dirty="0" smtClean="0"/>
+          </a:p>
+          <a:p>
+            <a:pPr marL="0" indent="0">
+              <a:buNone/>
+            </a:pPr>
+            <a:r>
+              <a:rPr lang="en-GB" sz="1050" dirty="0" smtClean="0"/>
+              <a:t>Upload the public key to your home directory and then ‘</a:t>
+            </a:r>
+            <a:r>
+              <a:rPr lang="en-GB" sz="1050" dirty="0" err="1" smtClean="0"/>
+              <a:t>sudo</a:t>
+            </a:r>
+            <a:r>
+              <a:rPr lang="en-GB" sz="1050" dirty="0" smtClean="0"/>
+              <a:t> </a:t>
+            </a:r>
+            <a:r>
+              <a:rPr lang="en-GB" sz="1050" dirty="0" err="1" smtClean="0"/>
+              <a:t>cp</a:t>
+            </a:r>
+            <a:r>
+              <a:rPr lang="en-GB" sz="1050" dirty="0" smtClean="0"/>
+              <a:t>’ it to the </a:t>
+            </a:r>
+            <a:r>
+              <a:rPr lang="en-GB" sz="1050" dirty="0" err="1" smtClean="0"/>
+              <a:t>gituser</a:t>
+            </a:r>
+            <a:r>
+              <a:rPr lang="en-GB" sz="1050" dirty="0" smtClean="0"/>
+              <a:t>/.</a:t>
+            </a:r>
+            <a:r>
+              <a:rPr lang="en-GB" sz="1050" dirty="0" err="1" smtClean="0"/>
+              <a:t>ssh</a:t>
+            </a:r>
+            <a:r>
+              <a:rPr lang="en-GB" sz="1050" dirty="0" smtClean="0"/>
+              <a:t> directory.</a:t>
+            </a:r>
+            <a:endParaRPr lang="en-GB" sz="1050" dirty="0"/>
+          </a:p>
+          <a:p>
+            <a:pPr marL="0" indent="0">
+              <a:buNone/>
+            </a:pPr>
+            <a:endParaRPr lang="en-GB" sz="1050" dirty="0" smtClean="0"/>
+          </a:p>
+          <a:p>
+            <a:pPr marL="0" indent="0">
+              <a:buNone/>
+            </a:pPr>
+            <a:endParaRPr lang="en-GB" sz="1050" dirty="0"/>
+          </a:p>
+          <a:p>
+            <a:pPr marL="0" indent="0">
+              <a:buNone/>
+            </a:pPr>
+            <a:r>
+              <a:rPr lang="en-GB" sz="1050" dirty="0" smtClean="0"/>
+              <a:t>$cd </a:t>
+            </a:r>
+            <a:r>
+              <a:rPr lang="en-GB" sz="1050" dirty="0"/>
+              <a:t>/home/</a:t>
+            </a:r>
+            <a:r>
+              <a:rPr lang="en-GB" sz="1050" dirty="0" err="1"/>
+              <a:t>gituser</a:t>
+            </a:r>
+            <a:r>
+              <a:rPr lang="en-GB" sz="1050" dirty="0"/>
+              <a:t>/.</a:t>
+            </a:r>
+            <a:r>
+              <a:rPr lang="en-GB" sz="1050" dirty="0" err="1"/>
+              <a:t>ssh</a:t>
+            </a:r>
+            <a:r>
+              <a:rPr lang="en-GB" sz="1050" dirty="0"/>
+              <a:t> </a:t>
+            </a:r>
+            <a:endParaRPr lang="en-GB" sz="1050" dirty="0" smtClean="0"/>
+          </a:p>
+          <a:p>
+            <a:pPr marL="0" indent="0">
+              <a:buNone/>
+            </a:pPr>
+            <a:endParaRPr lang="en-GB" sz="1050" dirty="0"/>
+          </a:p>
+          <a:p>
+            <a:pPr marL="0" indent="0">
+              <a:buNone/>
+            </a:pPr>
+            <a:r>
+              <a:rPr lang="en-GB" sz="1050" dirty="0" smtClean="0"/>
+              <a:t>$</a:t>
+            </a:r>
+            <a:r>
+              <a:rPr lang="en-GB" sz="1050" dirty="0" err="1" smtClean="0"/>
+              <a:t>sudo</a:t>
+            </a:r>
+            <a:r>
+              <a:rPr lang="en-GB" sz="1050" dirty="0" smtClean="0"/>
+              <a:t> </a:t>
+            </a:r>
+            <a:r>
+              <a:rPr lang="en-GB" sz="1050" dirty="0" err="1"/>
+              <a:t>chmod</a:t>
+            </a:r>
+            <a:r>
+              <a:rPr lang="en-GB" sz="1050" dirty="0"/>
+              <a:t> </a:t>
+            </a:r>
+            <a:r>
+              <a:rPr lang="en-GB" sz="1050" dirty="0" err="1"/>
+              <a:t>a+w</a:t>
+            </a:r>
+            <a:r>
+              <a:rPr lang="en-GB" sz="1050" dirty="0"/>
+              <a:t> </a:t>
+            </a:r>
+            <a:r>
+              <a:rPr lang="en-GB" sz="1050" dirty="0" err="1"/>
+              <a:t>authorized_keys</a:t>
+            </a:r>
+            <a:r>
+              <a:rPr lang="en-GB" sz="1050" dirty="0"/>
+              <a:t> </a:t>
+            </a:r>
+            <a:endParaRPr lang="en-GB" sz="1050" dirty="0" smtClean="0"/>
+          </a:p>
+          <a:p>
+            <a:pPr marL="0" indent="0">
+              <a:buNone/>
+            </a:pPr>
+            <a:endParaRPr lang="en-GB" sz="1050" dirty="0"/>
+          </a:p>
+          <a:p>
+            <a:pPr marL="0" indent="0">
+              <a:buNone/>
+            </a:pPr>
+            <a:r>
+              <a:rPr lang="en-GB" sz="1050" dirty="0" smtClean="0"/>
+              <a:t>$cat </a:t>
+            </a:r>
+            <a:r>
+              <a:rPr lang="en-GB" sz="1050" dirty="0"/>
+              <a:t>&lt;</a:t>
+            </a:r>
+            <a:r>
+              <a:rPr lang="en-GB" sz="1050" dirty="0" err="1"/>
+              <a:t>your_public_key</a:t>
+            </a:r>
+            <a:r>
+              <a:rPr lang="en-GB" sz="1050" dirty="0"/>
+              <a:t>&gt; &gt;&gt; </a:t>
+            </a:r>
+            <a:r>
+              <a:rPr lang="en-GB" sz="1050" dirty="0" err="1"/>
+              <a:t>authorized_keys</a:t>
+            </a:r>
+            <a:r>
+              <a:rPr lang="en-GB" sz="1050" dirty="0"/>
+              <a:t> </a:t>
+            </a:r>
+            <a:endParaRPr lang="en-GB" sz="1050" dirty="0" smtClean="0"/>
+          </a:p>
+          <a:p>
+            <a:pPr marL="0" indent="0">
+              <a:buNone/>
+            </a:pPr>
+            <a:endParaRPr lang="en-GB" sz="1050" dirty="0" smtClean="0"/>
+          </a:p>
+          <a:p>
+            <a:pPr marL="0" indent="0">
+              <a:buNone/>
+            </a:pPr>
+            <a:r>
+              <a:rPr lang="en-GB" sz="1050" dirty="0" smtClean="0"/>
+              <a:t>$</a:t>
+            </a:r>
+            <a:r>
+              <a:rPr lang="en-GB" sz="1050" dirty="0" err="1" smtClean="0"/>
+              <a:t>sudo</a:t>
+            </a:r>
+            <a:r>
+              <a:rPr lang="en-GB" sz="1050" dirty="0" smtClean="0"/>
+              <a:t> </a:t>
+            </a:r>
+            <a:r>
+              <a:rPr lang="en-GB" sz="1050" dirty="0" err="1"/>
+              <a:t>chmod</a:t>
+            </a:r>
+            <a:r>
+              <a:rPr lang="en-GB" sz="1050" dirty="0"/>
+              <a:t> a-w </a:t>
+            </a:r>
+            <a:r>
+              <a:rPr lang="en-GB" sz="1050" dirty="0" err="1" smtClean="0"/>
+              <a:t>authorized_keys</a:t>
+            </a:r>
+            <a:r>
+              <a:rPr lang="en-GB" sz="1050" dirty="0" smtClean="0"/>
+              <a:t>  &lt;&lt;&lt; Do not forget this one or people will be asked for a password to access GIT&gt;&gt;&gt;</a:t>
+            </a:r>
+            <a:endParaRPr lang="en-GB" dirty="0" smtClean="0"/>
+          </a:p>
+          <a:p>
+            <a:pPr marL="0" indent="0">
+              <a:buNone/>
+            </a:pPr>
+            <a:r>
+              <a:rPr lang="en-GB" dirty="0" smtClean="0"/>
+              <a:t> </a:t>
+            </a:r>
+          </a:p>
+          <a:p>
+            <a:pPr marL="0" indent="0">
+              <a:buNone/>
+            </a:pPr>
+            <a:r>
+              <a:rPr lang="en-GB" dirty="0" smtClean="0"/>
+              <a:t> </a:t>
+            </a:r>
+          </a:p>
+          <a:p>
+            <a:pPr marL="0" indent="0">
+              <a:buNone/>
+            </a:pPr>
+            <a:endParaRPr lang="en-GB" dirty="0" smtClean="0"/>
+          </a:p>
+          <a:p>
+            <a:pPr marL="0" indent="0">
+              <a:buNone/>
+            </a:pPr>
+            <a:r>
+              <a:rPr lang="en-GB" dirty="0" smtClean="0"/>
+              <a:t> </a:t>
+            </a:r>
+          </a:p>
+          <a:p>
+            <a:pPr marL="0" indent="0">
+              <a:buNone/>
+            </a:pPr>
+            <a:endParaRPr lang="en-GB" dirty="0" smtClean="0"/>
+          </a:p>
+        </p:txBody>
+      </p:sp>
+    </p:spTree>
+    <p:extLst>
+      <p:ext uri="{BB962C8B-B14F-4D97-AF65-F5344CB8AC3E}">
+        <p14:creationId xmlns:p14="http://schemas.microsoft.com/office/powerpoint/2010/main" val="165522960"/>
+      </p:ext>
+    </p:extLst>
+  </p:cSld>
+  <p:clrMapOvr>
+    <a:masterClrMapping/>
+  </p:clrMapOvr>
+  <p:timing>
+    <p:tnLst>
+      <p:par>
+        <p:cTn id="1" dur="indefinite" restart="never" nodeType="tmRoot"/>
+      </p:par>
+    </p:tnLst>
+  </p:timing>
+</p:sld>
+</file>
+
+<file path=ppt/slides/slide12.xml><?xml version="1.0" encoding="utf-8"?>
+<p:sld xmlns:a="http://schemas.openxmlformats.org/drawingml/2006/main" xmlns:r="http://schemas.openxmlformats.org/officeDocument/2006/relationships" xmlns:p="http://schemas.openxmlformats.org/presentationml/2006/main">
+  <p:cSld>
+    <p:spTree>
+      <p:nvGrpSpPr>
+        <p:cNvPr id="1" name=""/>
+        <p:cNvGrpSpPr/>
+        <p:nvPr/>
+      </p:nvGrpSpPr>
+      <p:grpSpPr>
+        <a:xfrm>
+          <a:off x="0" y="0"/>
+          <a:ext cx="0" cy="0"/>
+          <a:chOff x="0" y="0"/>
+          <a:chExt cx="0" cy="0"/>
+        </a:xfrm>
+      </p:grpSpPr>
+      <p:sp>
+        <p:nvSpPr>
+          <p:cNvPr id="2" name="Title 1"/>
+          <p:cNvSpPr>
+            <a:spLocks noGrp="1"/>
+          </p:cNvSpPr>
+          <p:nvPr>
+            <p:ph type="title"/>
+          </p:nvPr>
+        </p:nvSpPr>
+        <p:spPr/>
+        <p:txBody>
+          <a:bodyPr/>
+          <a:lstStyle/>
+          <a:p>
+            <a:r>
+              <a:rPr lang="en-GB" dirty="0" smtClean="0"/>
+              <a:t>GIT Setup – Add files</a:t>
+            </a:r>
+            <a:endParaRPr lang="en-GB" dirty="0"/>
+          </a:p>
+        </p:txBody>
+      </p:sp>
+      <p:sp>
+        <p:nvSpPr>
+          <p:cNvPr id="3" name="Content Placeholder 2"/>
+          <p:cNvSpPr>
+            <a:spLocks noGrp="1"/>
+          </p:cNvSpPr>
+          <p:nvPr>
+            <p:ph idx="1"/>
+          </p:nvPr>
+        </p:nvSpPr>
+        <p:spPr>
+          <a:xfrm>
+            <a:off x="457200" y="1600200"/>
+            <a:ext cx="8579296" cy="4525963"/>
+          </a:xfrm>
+        </p:spPr>
+        <p:txBody>
+          <a:bodyPr>
             <a:normAutofit fontScale="70000" lnSpcReduction="20000"/>
           </a:bodyPr>
           <a:lstStyle/>
@@ -4103,11 +4448,7 @@
             </a:pPr>
             <a:r>
               <a:rPr lang="en-GB" sz="4000" dirty="0" smtClean="0"/>
-              <a:t>$ git remote add origin </a:t>
-            </a:r>
-            <a:r>
-              <a:rPr lang="en-GB" sz="4000" dirty="0" smtClean="0"/>
-              <a:t>ssh://gituser@10.165.255.22/home/gituser/GIT_repositories/project1.git</a:t>
+              <a:t>$ git remote add origin ssh://gituser@10.165.255.22/home/gituser/GIT_repositories/project1.git</a:t>
             </a:r>
           </a:p>
           <a:p>
@@ -4131,10 +4472,9 @@
               <a:buNone/>
             </a:pPr>
             <a:r>
-              <a:rPr lang="en-GB" smtClean="0"/>
+              <a:rPr lang="en-GB" dirty="0" smtClean="0"/>
               <a:t> Repo is now setup for team to CLONE.</a:t>
             </a:r>
-            <a:endParaRPr lang="en-GB" dirty="0" smtClean="0"/>
           </a:p>
           <a:p>
             <a:pPr marL="0" indent="0">
@@ -5869,11 +6209,11 @@
   <p:clrMapOvr>
     <a:masterClrMapping/>
   </p:clrMapOvr>
-  <mc:AlternateContent xmlns:mc="http://schemas.openxmlformats.org/markup-compatibility/2006">
-    <mc:Choice xmlns:p14="http://schemas.microsoft.com/office/powerpoint/2010/main" Requires="p14">
+  <mc:AlternateContent xmlns:mc="http://schemas.openxmlformats.org/markup-compatibility/2006" xmlns:p14="http://schemas.microsoft.com/office/powerpoint/2010/main">
+    <mc:Choice Requires="p14">
       <p:transition spd="slow" p14:dur="2000"/>
     </mc:Choice>
-    <mc:Fallback>
+    <mc:Fallback xmlns="">
       <p:transition spd="slow"/>
     </mc:Fallback>
   </mc:AlternateContent>

</xml_diff>

<commit_message>
Added template slide and file (file is attached to slide)
</commit_message>
<xml_diff>
--- a/AutomationSetup.pptx
+++ b/AutomationSetup.pptx
@@ -5,7 +5,7 @@
     <p:sldMasterId id="2147483648" r:id="rId1"/>
   </p:sldMasterIdLst>
   <p:notesMasterIdLst>
-    <p:notesMasterId r:id="rId14"/>
+    <p:notesMasterId r:id="rId15"/>
   </p:notesMasterIdLst>
   <p:sldIdLst>
     <p:sldId id="256" r:id="rId2"/>
@@ -18,8 +18,9 @@
     <p:sldId id="265" r:id="rId9"/>
     <p:sldId id="266" r:id="rId10"/>
     <p:sldId id="267" r:id="rId11"/>
-    <p:sldId id="269" r:id="rId12"/>
-    <p:sldId id="268" r:id="rId13"/>
+    <p:sldId id="270" r:id="rId12"/>
+    <p:sldId id="269" r:id="rId13"/>
+    <p:sldId id="268" r:id="rId14"/>
   </p:sldIdLst>
   <p:sldSz cx="9144000" cy="6858000" type="screen4x3"/>
   <p:notesSz cx="6858000" cy="9144000"/>
@@ -203,7 +204,7 @@
           <a:p>
             <a:fld id="{D93C6ADC-BABE-4B99-AE89-C85FD8DD4126}" type="datetimeFigureOut">
               <a:rPr lang="en-GB" smtClean="0"/>
-              <a:t>30/09/2014</a:t>
+              <a:t>09/10/2014</a:t>
             </a:fld>
             <a:endParaRPr lang="en-GB"/>
           </a:p>
@@ -731,7 +732,7 @@
           <a:p>
             <a:fld id="{34634343-A678-4218-A349-B0FA4106C404}" type="datetimeFigureOut">
               <a:rPr lang="en-GB" smtClean="0"/>
-              <a:t>30/09/2014</a:t>
+              <a:t>09/10/2014</a:t>
             </a:fld>
             <a:endParaRPr lang="en-GB"/>
           </a:p>
@@ -901,7 +902,7 @@
           <a:p>
             <a:fld id="{34634343-A678-4218-A349-B0FA4106C404}" type="datetimeFigureOut">
               <a:rPr lang="en-GB" smtClean="0"/>
-              <a:t>30/09/2014</a:t>
+              <a:t>09/10/2014</a:t>
             </a:fld>
             <a:endParaRPr lang="en-GB"/>
           </a:p>
@@ -1081,7 +1082,7 @@
           <a:p>
             <a:fld id="{34634343-A678-4218-A349-B0FA4106C404}" type="datetimeFigureOut">
               <a:rPr lang="en-GB" smtClean="0"/>
-              <a:t>30/09/2014</a:t>
+              <a:t>09/10/2014</a:t>
             </a:fld>
             <a:endParaRPr lang="en-GB"/>
           </a:p>
@@ -1251,7 +1252,7 @@
           <a:p>
             <a:fld id="{34634343-A678-4218-A349-B0FA4106C404}" type="datetimeFigureOut">
               <a:rPr lang="en-GB" smtClean="0"/>
-              <a:t>30/09/2014</a:t>
+              <a:t>09/10/2014</a:t>
             </a:fld>
             <a:endParaRPr lang="en-GB"/>
           </a:p>
@@ -1497,7 +1498,7 @@
           <a:p>
             <a:fld id="{34634343-A678-4218-A349-B0FA4106C404}" type="datetimeFigureOut">
               <a:rPr lang="en-GB" smtClean="0"/>
-              <a:t>30/09/2014</a:t>
+              <a:t>09/10/2014</a:t>
             </a:fld>
             <a:endParaRPr lang="en-GB"/>
           </a:p>
@@ -1785,7 +1786,7 @@
           <a:p>
             <a:fld id="{34634343-A678-4218-A349-B0FA4106C404}" type="datetimeFigureOut">
               <a:rPr lang="en-GB" smtClean="0"/>
-              <a:t>30/09/2014</a:t>
+              <a:t>09/10/2014</a:t>
             </a:fld>
             <a:endParaRPr lang="en-GB"/>
           </a:p>
@@ -2207,7 +2208,7 @@
           <a:p>
             <a:fld id="{34634343-A678-4218-A349-B0FA4106C404}" type="datetimeFigureOut">
               <a:rPr lang="en-GB" smtClean="0"/>
-              <a:t>30/09/2014</a:t>
+              <a:t>09/10/2014</a:t>
             </a:fld>
             <a:endParaRPr lang="en-GB"/>
           </a:p>
@@ -2325,7 +2326,7 @@
           <a:p>
             <a:fld id="{34634343-A678-4218-A349-B0FA4106C404}" type="datetimeFigureOut">
               <a:rPr lang="en-GB" smtClean="0"/>
-              <a:t>30/09/2014</a:t>
+              <a:t>09/10/2014</a:t>
             </a:fld>
             <a:endParaRPr lang="en-GB"/>
           </a:p>
@@ -2420,7 +2421,7 @@
           <a:p>
             <a:fld id="{34634343-A678-4218-A349-B0FA4106C404}" type="datetimeFigureOut">
               <a:rPr lang="en-GB" smtClean="0"/>
-              <a:t>30/09/2014</a:t>
+              <a:t>09/10/2014</a:t>
             </a:fld>
             <a:endParaRPr lang="en-GB"/>
           </a:p>
@@ -2697,7 +2698,7 @@
           <a:p>
             <a:fld id="{34634343-A678-4218-A349-B0FA4106C404}" type="datetimeFigureOut">
               <a:rPr lang="en-GB" smtClean="0"/>
-              <a:t>30/09/2014</a:t>
+              <a:t>09/10/2014</a:t>
             </a:fld>
             <a:endParaRPr lang="en-GB"/>
           </a:p>
@@ -2950,7 +2951,7 @@
           <a:p>
             <a:fld id="{34634343-A678-4218-A349-B0FA4106C404}" type="datetimeFigureOut">
               <a:rPr lang="en-GB" smtClean="0"/>
-              <a:t>30/09/2014</a:t>
+              <a:t>09/10/2014</a:t>
             </a:fld>
             <a:endParaRPr lang="en-GB"/>
           </a:p>
@@ -3163,7 +3164,7 @@
           <a:p>
             <a:fld id="{34634343-A678-4218-A349-B0FA4106C404}" type="datetimeFigureOut">
               <a:rPr lang="en-GB" smtClean="0"/>
-              <a:t>30/09/2014</a:t>
+              <a:t>09/10/2014</a:t>
             </a:fld>
             <a:endParaRPr lang="en-GB"/>
           </a:p>
@@ -4022,7 +4023,709 @@
             </a:r>
             <a:r>
               <a:rPr lang="en-GB" dirty="0" smtClean="0"/>
-              <a:t>.</a:t>
+              <a:t>Template</a:t>
+            </a:r>
+            <a:endParaRPr lang="en-GB" dirty="0"/>
+          </a:p>
+        </p:txBody>
+      </p:sp>
+      <p:sp>
+        <p:nvSpPr>
+          <p:cNvPr id="3" name="Content Placeholder 2"/>
+          <p:cNvSpPr>
+            <a:spLocks noGrp="1"/>
+          </p:cNvSpPr>
+          <p:nvPr>
+            <p:ph idx="1"/>
+          </p:nvPr>
+        </p:nvSpPr>
+        <p:spPr>
+          <a:xfrm>
+            <a:off x="457200" y="1600200"/>
+            <a:ext cx="8579296" cy="4525963"/>
+          </a:xfrm>
+        </p:spPr>
+        <p:txBody>
+          <a:bodyPr>
+            <a:normAutofit fontScale="32500" lnSpcReduction="20000"/>
+          </a:bodyPr>
+          <a:lstStyle/>
+          <a:p>
+            <a:pPr marL="0" indent="0">
+              <a:buNone/>
+            </a:pPr>
+            <a:r>
+              <a:rPr lang="en-GB" sz="4300" dirty="0" smtClean="0"/>
+              <a:t>In the hooks directory you can see a list of templates:</a:t>
+            </a:r>
+            <a:br>
+              <a:rPr lang="en-GB" sz="4300" dirty="0" smtClean="0"/>
+            </a:br>
+            <a:endParaRPr lang="en-GB" sz="4300" dirty="0" smtClean="0"/>
+          </a:p>
+          <a:p>
+            <a:pPr marL="0" indent="0">
+              <a:buNone/>
+            </a:pPr>
+            <a:r>
+              <a:rPr lang="en-GB" sz="4300" dirty="0"/>
+              <a:t>$ </a:t>
+            </a:r>
+            <a:r>
+              <a:rPr lang="en-GB" sz="4300" dirty="0" err="1"/>
+              <a:t>pwd</a:t>
+            </a:r>
+            <a:r>
+              <a:rPr lang="en-GB" sz="4300" dirty="0"/>
+              <a:t>  </a:t>
+            </a:r>
+          </a:p>
+          <a:p>
+            <a:pPr marL="0" indent="0">
+              <a:buNone/>
+            </a:pPr>
+            <a:r>
+              <a:rPr lang="en-GB" sz="4300" dirty="0"/>
+              <a:t>/home/</a:t>
+            </a:r>
+            <a:r>
+              <a:rPr lang="en-GB" sz="4300" dirty="0" err="1"/>
+              <a:t>gituser</a:t>
+            </a:r>
+            <a:r>
+              <a:rPr lang="en-GB" sz="4300" dirty="0"/>
+              <a:t>/</a:t>
+            </a:r>
+            <a:r>
+              <a:rPr lang="en-GB" sz="4300" dirty="0" err="1"/>
+              <a:t>GIT_repositories</a:t>
+            </a:r>
+            <a:r>
+              <a:rPr lang="en-GB" sz="4300" dirty="0"/>
+              <a:t>/</a:t>
+            </a:r>
+            <a:r>
+              <a:rPr lang="en-GB" sz="4300" dirty="0" err="1"/>
+              <a:t>MVN_Selenium.git</a:t>
+            </a:r>
+            <a:r>
+              <a:rPr lang="en-GB" sz="4300" dirty="0"/>
+              <a:t>/hooks</a:t>
+            </a:r>
+          </a:p>
+          <a:p>
+            <a:pPr marL="0" indent="0">
+              <a:buNone/>
+            </a:pPr>
+            <a:r>
+              <a:rPr lang="en-GB" sz="4300" dirty="0"/>
+              <a:t>$ </a:t>
+            </a:r>
+            <a:r>
+              <a:rPr lang="en-GB" sz="4300" dirty="0" err="1"/>
+              <a:t>ls</a:t>
+            </a:r>
+            <a:r>
+              <a:rPr lang="en-GB" sz="4300" dirty="0"/>
+              <a:t> -l</a:t>
+            </a:r>
+          </a:p>
+          <a:p>
+            <a:pPr marL="0" indent="0">
+              <a:buNone/>
+            </a:pPr>
+            <a:r>
+              <a:rPr lang="en-GB" sz="4300" dirty="0"/>
+              <a:t>total 40</a:t>
+            </a:r>
+          </a:p>
+          <a:p>
+            <a:pPr marL="0" indent="0">
+              <a:buNone/>
+            </a:pPr>
+            <a:r>
+              <a:rPr lang="en-GB" sz="4300" dirty="0"/>
+              <a:t>-</a:t>
+            </a:r>
+            <a:r>
+              <a:rPr lang="en-GB" sz="4300" dirty="0" err="1"/>
+              <a:t>rwxr</a:t>
+            </a:r>
+            <a:r>
+              <a:rPr lang="en-GB" sz="4300" dirty="0"/>
+              <a:t>-</a:t>
+            </a:r>
+            <a:r>
+              <a:rPr lang="en-GB" sz="4300" dirty="0" err="1"/>
+              <a:t>xr</a:t>
+            </a:r>
+            <a:r>
+              <a:rPr lang="en-GB" sz="4300" dirty="0"/>
+              <a:t>-x 1 </a:t>
+            </a:r>
+            <a:r>
+              <a:rPr lang="en-GB" sz="4300" dirty="0" err="1"/>
+              <a:t>gituser</a:t>
+            </a:r>
+            <a:r>
+              <a:rPr lang="en-GB" sz="4300" dirty="0"/>
+              <a:t> </a:t>
+            </a:r>
+            <a:r>
+              <a:rPr lang="en-GB" sz="4300" dirty="0" err="1"/>
+              <a:t>gituser</a:t>
+            </a:r>
+            <a:r>
+              <a:rPr lang="en-GB" sz="4300" dirty="0"/>
+              <a:t>  452 Jun  4 11:38 </a:t>
+            </a:r>
+            <a:r>
+              <a:rPr lang="en-GB" sz="4300" dirty="0" err="1"/>
+              <a:t>applypatch-msg.sample</a:t>
+            </a:r>
+            <a:endParaRPr lang="en-GB" sz="4300" dirty="0"/>
+          </a:p>
+          <a:p>
+            <a:pPr marL="0" indent="0">
+              <a:buNone/>
+            </a:pPr>
+            <a:r>
+              <a:rPr lang="en-GB" sz="4300" dirty="0"/>
+              <a:t>-</a:t>
+            </a:r>
+            <a:r>
+              <a:rPr lang="en-GB" sz="4300" dirty="0" err="1"/>
+              <a:t>rwxr</a:t>
+            </a:r>
+            <a:r>
+              <a:rPr lang="en-GB" sz="4300" dirty="0"/>
+              <a:t>-</a:t>
+            </a:r>
+            <a:r>
+              <a:rPr lang="en-GB" sz="4300" dirty="0" err="1"/>
+              <a:t>xr</a:t>
+            </a:r>
+            <a:r>
+              <a:rPr lang="en-GB" sz="4300" dirty="0"/>
+              <a:t>-x 1 </a:t>
+            </a:r>
+            <a:r>
+              <a:rPr lang="en-GB" sz="4300" dirty="0" err="1"/>
+              <a:t>gituser</a:t>
+            </a:r>
+            <a:r>
+              <a:rPr lang="en-GB" sz="4300" dirty="0"/>
+              <a:t> </a:t>
+            </a:r>
+            <a:r>
+              <a:rPr lang="en-GB" sz="4300" dirty="0" err="1"/>
+              <a:t>gituser</a:t>
+            </a:r>
+            <a:r>
+              <a:rPr lang="en-GB" sz="4300" dirty="0"/>
+              <a:t>  896 Jun  4 11:38 commit-</a:t>
+            </a:r>
+            <a:r>
+              <a:rPr lang="en-GB" sz="4300" dirty="0" err="1"/>
+              <a:t>msg.sample</a:t>
+            </a:r>
+            <a:endParaRPr lang="en-GB" sz="4300" dirty="0"/>
+          </a:p>
+          <a:p>
+            <a:pPr marL="0" indent="0">
+              <a:buNone/>
+            </a:pPr>
+            <a:r>
+              <a:rPr lang="en-GB" sz="4300" b="1" dirty="0"/>
+              <a:t>-</a:t>
+            </a:r>
+            <a:r>
+              <a:rPr lang="en-GB" sz="4300" b="1" dirty="0" err="1"/>
+              <a:t>rwxr</a:t>
+            </a:r>
+            <a:r>
+              <a:rPr lang="en-GB" sz="4300" b="1" dirty="0"/>
+              <a:t>-</a:t>
+            </a:r>
+            <a:r>
+              <a:rPr lang="en-GB" sz="4300" b="1" dirty="0" err="1"/>
+              <a:t>xr</a:t>
+            </a:r>
+            <a:r>
+              <a:rPr lang="en-GB" sz="4300" b="1" dirty="0"/>
+              <a:t>-x 1 </a:t>
+            </a:r>
+            <a:r>
+              <a:rPr lang="en-GB" sz="4300" b="1" dirty="0" err="1"/>
+              <a:t>gituser</a:t>
+            </a:r>
+            <a:r>
+              <a:rPr lang="en-GB" sz="4300" b="1" dirty="0"/>
+              <a:t> </a:t>
+            </a:r>
+            <a:r>
+              <a:rPr lang="en-GB" sz="4300" b="1" dirty="0" err="1"/>
+              <a:t>gituser</a:t>
+            </a:r>
+            <a:r>
+              <a:rPr lang="en-GB" sz="4300" b="1" dirty="0"/>
+              <a:t>  546 Jun 12 10:05 post-receive</a:t>
+            </a:r>
+          </a:p>
+          <a:p>
+            <a:pPr marL="0" indent="0">
+              <a:buNone/>
+            </a:pPr>
+            <a:r>
+              <a:rPr lang="en-GB" sz="4300" dirty="0"/>
+              <a:t>-</a:t>
+            </a:r>
+            <a:r>
+              <a:rPr lang="en-GB" sz="4300" dirty="0" err="1"/>
+              <a:t>rwxr</a:t>
+            </a:r>
+            <a:r>
+              <a:rPr lang="en-GB" sz="4300" dirty="0"/>
+              <a:t>-</a:t>
+            </a:r>
+            <a:r>
+              <a:rPr lang="en-GB" sz="4300" dirty="0" err="1"/>
+              <a:t>xr</a:t>
+            </a:r>
+            <a:r>
+              <a:rPr lang="en-GB" sz="4300" dirty="0"/>
+              <a:t>-x 1 </a:t>
+            </a:r>
+            <a:r>
+              <a:rPr lang="en-GB" sz="4300" dirty="0" err="1"/>
+              <a:t>gituser</a:t>
+            </a:r>
+            <a:r>
+              <a:rPr lang="en-GB" sz="4300" dirty="0"/>
+              <a:t> </a:t>
+            </a:r>
+            <a:r>
+              <a:rPr lang="en-GB" sz="4300" dirty="0" err="1"/>
+              <a:t>gituser</a:t>
+            </a:r>
+            <a:r>
+              <a:rPr lang="en-GB" sz="4300" dirty="0"/>
+              <a:t>  189 Jun  4 11:38 post-</a:t>
+            </a:r>
+            <a:r>
+              <a:rPr lang="en-GB" sz="4300" dirty="0" err="1"/>
+              <a:t>update.sample</a:t>
+            </a:r>
+            <a:endParaRPr lang="en-GB" sz="4300" dirty="0"/>
+          </a:p>
+          <a:p>
+            <a:pPr marL="0" indent="0">
+              <a:buNone/>
+            </a:pPr>
+            <a:r>
+              <a:rPr lang="en-GB" sz="4300" dirty="0"/>
+              <a:t>-</a:t>
+            </a:r>
+            <a:r>
+              <a:rPr lang="en-GB" sz="4300" dirty="0" err="1"/>
+              <a:t>rwxr</a:t>
+            </a:r>
+            <a:r>
+              <a:rPr lang="en-GB" sz="4300" dirty="0"/>
+              <a:t>-</a:t>
+            </a:r>
+            <a:r>
+              <a:rPr lang="en-GB" sz="4300" dirty="0" err="1"/>
+              <a:t>xr</a:t>
+            </a:r>
+            <a:r>
+              <a:rPr lang="en-GB" sz="4300" dirty="0"/>
+              <a:t>-x 1 </a:t>
+            </a:r>
+            <a:r>
+              <a:rPr lang="en-GB" sz="4300" dirty="0" err="1"/>
+              <a:t>gituser</a:t>
+            </a:r>
+            <a:r>
+              <a:rPr lang="en-GB" sz="4300" dirty="0"/>
+              <a:t> </a:t>
+            </a:r>
+            <a:r>
+              <a:rPr lang="en-GB" sz="4300" dirty="0" err="1"/>
+              <a:t>gituser</a:t>
+            </a:r>
+            <a:r>
+              <a:rPr lang="en-GB" sz="4300" dirty="0"/>
+              <a:t>  398 Jun  4 11:38 pre-</a:t>
+            </a:r>
+            <a:r>
+              <a:rPr lang="en-GB" sz="4300" dirty="0" err="1"/>
+              <a:t>applypatch.sample</a:t>
+            </a:r>
+            <a:endParaRPr lang="en-GB" sz="4300" dirty="0"/>
+          </a:p>
+          <a:p>
+            <a:pPr marL="0" indent="0">
+              <a:buNone/>
+            </a:pPr>
+            <a:r>
+              <a:rPr lang="en-GB" sz="4300" dirty="0"/>
+              <a:t>-</a:t>
+            </a:r>
+            <a:r>
+              <a:rPr lang="en-GB" sz="4300" dirty="0" err="1"/>
+              <a:t>rwxr</a:t>
+            </a:r>
+            <a:r>
+              <a:rPr lang="en-GB" sz="4300" dirty="0"/>
+              <a:t>-</a:t>
+            </a:r>
+            <a:r>
+              <a:rPr lang="en-GB" sz="4300" dirty="0" err="1"/>
+              <a:t>xr</a:t>
+            </a:r>
+            <a:r>
+              <a:rPr lang="en-GB" sz="4300" dirty="0"/>
+              <a:t>-x 1 </a:t>
+            </a:r>
+            <a:r>
+              <a:rPr lang="en-GB" sz="4300" dirty="0" err="1"/>
+              <a:t>gituser</a:t>
+            </a:r>
+            <a:r>
+              <a:rPr lang="en-GB" sz="4300" dirty="0"/>
+              <a:t> </a:t>
+            </a:r>
+            <a:r>
+              <a:rPr lang="en-GB" sz="4300" dirty="0" err="1"/>
+              <a:t>gituser</a:t>
+            </a:r>
+            <a:r>
+              <a:rPr lang="en-GB" sz="4300" dirty="0"/>
+              <a:t> 1704 Jun  4 11:38 pre-</a:t>
+            </a:r>
+            <a:r>
+              <a:rPr lang="en-GB" sz="4300" dirty="0" err="1"/>
+              <a:t>commit.sample</a:t>
+            </a:r>
+            <a:endParaRPr lang="en-GB" sz="4300" dirty="0"/>
+          </a:p>
+          <a:p>
+            <a:pPr marL="0" indent="0">
+              <a:buNone/>
+            </a:pPr>
+            <a:r>
+              <a:rPr lang="en-GB" sz="4300" dirty="0"/>
+              <a:t>-</a:t>
+            </a:r>
+            <a:r>
+              <a:rPr lang="en-GB" sz="4300" dirty="0" err="1"/>
+              <a:t>rwxr</a:t>
+            </a:r>
+            <a:r>
+              <a:rPr lang="en-GB" sz="4300" dirty="0"/>
+              <a:t>-</a:t>
+            </a:r>
+            <a:r>
+              <a:rPr lang="en-GB" sz="4300" dirty="0" err="1"/>
+              <a:t>xr</a:t>
+            </a:r>
+            <a:r>
+              <a:rPr lang="en-GB" sz="4300" dirty="0"/>
+              <a:t>-x 1 </a:t>
+            </a:r>
+            <a:r>
+              <a:rPr lang="en-GB" sz="4300" dirty="0" err="1"/>
+              <a:t>gituser</a:t>
+            </a:r>
+            <a:r>
+              <a:rPr lang="en-GB" sz="4300" dirty="0"/>
+              <a:t> </a:t>
+            </a:r>
+            <a:r>
+              <a:rPr lang="en-GB" sz="4300" dirty="0" err="1"/>
+              <a:t>gituser</a:t>
+            </a:r>
+            <a:r>
+              <a:rPr lang="en-GB" sz="4300" dirty="0"/>
+              <a:t> 1239 Jun  4 11:38 prepare-commit-</a:t>
+            </a:r>
+            <a:r>
+              <a:rPr lang="en-GB" sz="4300" dirty="0" err="1"/>
+              <a:t>msg.sample</a:t>
+            </a:r>
+            <a:endParaRPr lang="en-GB" sz="4300" dirty="0"/>
+          </a:p>
+          <a:p>
+            <a:pPr marL="0" indent="0">
+              <a:buNone/>
+            </a:pPr>
+            <a:r>
+              <a:rPr lang="en-GB" sz="4300" dirty="0"/>
+              <a:t>-</a:t>
+            </a:r>
+            <a:r>
+              <a:rPr lang="en-GB" sz="4300" dirty="0" err="1"/>
+              <a:t>rwxr</a:t>
+            </a:r>
+            <a:r>
+              <a:rPr lang="en-GB" sz="4300" dirty="0"/>
+              <a:t>-</a:t>
+            </a:r>
+            <a:r>
+              <a:rPr lang="en-GB" sz="4300" dirty="0" err="1"/>
+              <a:t>xr</a:t>
+            </a:r>
+            <a:r>
+              <a:rPr lang="en-GB" sz="4300" dirty="0"/>
+              <a:t>-x 1 </a:t>
+            </a:r>
+            <a:r>
+              <a:rPr lang="en-GB" sz="4300" dirty="0" err="1"/>
+              <a:t>gituser</a:t>
+            </a:r>
+            <a:r>
+              <a:rPr lang="en-GB" sz="4300" dirty="0"/>
+              <a:t> </a:t>
+            </a:r>
+            <a:r>
+              <a:rPr lang="en-GB" sz="4300" dirty="0" err="1"/>
+              <a:t>gituser</a:t>
+            </a:r>
+            <a:r>
+              <a:rPr lang="en-GB" sz="4300" dirty="0"/>
+              <a:t> 4898 Jun  4 11:38 pre-</a:t>
+            </a:r>
+            <a:r>
+              <a:rPr lang="en-GB" sz="4300" dirty="0" err="1"/>
+              <a:t>rebase.sample</a:t>
+            </a:r>
+            <a:endParaRPr lang="en-GB" sz="4300" dirty="0"/>
+          </a:p>
+          <a:p>
+            <a:pPr marL="0" indent="0">
+              <a:buNone/>
+            </a:pPr>
+            <a:r>
+              <a:rPr lang="en-GB" sz="4300" dirty="0"/>
+              <a:t>-</a:t>
+            </a:r>
+            <a:r>
+              <a:rPr lang="en-GB" sz="4300" dirty="0" err="1"/>
+              <a:t>rwxr</a:t>
+            </a:r>
+            <a:r>
+              <a:rPr lang="en-GB" sz="4300" dirty="0"/>
+              <a:t>-</a:t>
+            </a:r>
+            <a:r>
+              <a:rPr lang="en-GB" sz="4300" dirty="0" err="1"/>
+              <a:t>xr</a:t>
+            </a:r>
+            <a:r>
+              <a:rPr lang="en-GB" sz="4300" dirty="0"/>
+              <a:t>-x 1 </a:t>
+            </a:r>
+            <a:r>
+              <a:rPr lang="en-GB" sz="4300" dirty="0" err="1"/>
+              <a:t>gituser</a:t>
+            </a:r>
+            <a:r>
+              <a:rPr lang="en-GB" sz="4300" dirty="0"/>
+              <a:t> </a:t>
+            </a:r>
+            <a:r>
+              <a:rPr lang="en-GB" sz="4300" dirty="0" err="1"/>
+              <a:t>gituser</a:t>
+            </a:r>
+            <a:r>
+              <a:rPr lang="en-GB" sz="4300" dirty="0"/>
+              <a:t> 3611 Jun  4 11:38 </a:t>
+            </a:r>
+            <a:r>
+              <a:rPr lang="en-GB" sz="4300" dirty="0" err="1"/>
+              <a:t>update.sample</a:t>
+            </a:r>
+            <a:endParaRPr lang="en-GB" sz="4300" dirty="0"/>
+          </a:p>
+          <a:p>
+            <a:pPr marL="0" indent="0">
+              <a:buNone/>
+            </a:pPr>
+            <a:endParaRPr lang="en-GB" sz="4300" dirty="0" smtClean="0"/>
+          </a:p>
+          <a:p>
+            <a:pPr marL="0" indent="0">
+              <a:buNone/>
+            </a:pPr>
+            <a:r>
+              <a:rPr lang="en-GB" dirty="0" smtClean="0"/>
+              <a:t>Not sure where this one comes from as it does not appear to be delivered now.  I copy it from previous repositories but have also attached a copy here.</a:t>
+            </a:r>
+          </a:p>
+          <a:p>
+            <a:pPr marL="0" indent="0">
+              <a:buNone/>
+            </a:pPr>
+            <a:r>
+              <a:rPr lang="en-GB" dirty="0" smtClean="0"/>
+              <a:t>Make sure the template has the correct permissions.</a:t>
+            </a:r>
+            <a:endParaRPr lang="en-GB" dirty="0" smtClean="0"/>
+          </a:p>
+          <a:p>
+            <a:pPr marL="0" indent="0">
+              <a:buNone/>
+            </a:pPr>
+            <a:r>
+              <a:rPr lang="en-GB" dirty="0" smtClean="0"/>
+              <a:t> </a:t>
+            </a:r>
+          </a:p>
+          <a:p>
+            <a:pPr marL="0" indent="0">
+              <a:buNone/>
+            </a:pPr>
+            <a:r>
+              <a:rPr lang="en-GB" dirty="0" smtClean="0"/>
+              <a:t> </a:t>
+            </a:r>
+          </a:p>
+          <a:p>
+            <a:pPr marL="0" indent="0">
+              <a:buNone/>
+            </a:pPr>
+            <a:endParaRPr lang="en-GB" dirty="0" smtClean="0"/>
+          </a:p>
+          <a:p>
+            <a:pPr marL="0" indent="0">
+              <a:buNone/>
+            </a:pPr>
+            <a:r>
+              <a:rPr lang="en-GB" dirty="0" smtClean="0"/>
+              <a:t> </a:t>
+            </a:r>
+          </a:p>
+          <a:p>
+            <a:pPr marL="0" indent="0">
+              <a:buNone/>
+            </a:pPr>
+            <a:endParaRPr lang="en-GB" dirty="0" smtClean="0"/>
+          </a:p>
+        </p:txBody>
+      </p:sp>
+      <p:graphicFrame>
+        <p:nvGraphicFramePr>
+          <p:cNvPr id="4" name="Object 3"/>
+          <p:cNvGraphicFramePr>
+            <a:graphicFrameLocks noChangeAspect="1"/>
+          </p:cNvGraphicFramePr>
+          <p:nvPr>
+            <p:extLst>
+              <p:ext uri="{D42A27DB-BD31-4B8C-83A1-F6EECF244321}">
+                <p14:modId xmlns:p14="http://schemas.microsoft.com/office/powerpoint/2010/main" val="1653130150"/>
+              </p:ext>
+            </p:extLst>
+          </p:nvPr>
+        </p:nvGraphicFramePr>
+        <p:xfrm>
+          <a:off x="7983538" y="5384800"/>
+          <a:ext cx="1041400" cy="685800"/>
+        </p:xfrm>
+        <a:graphic>
+          <a:graphicData uri="http://schemas.openxmlformats.org/presentationml/2006/ole">
+            <mc:AlternateContent xmlns:mc="http://schemas.openxmlformats.org/markup-compatibility/2006">
+              <mc:Choice xmlns:v="urn:schemas-microsoft-com:vml" Requires="v">
+                <p:oleObj spid="_x0000_s1026" name="Packager Shell Object" showAsIcon="1" r:id="rId3" imgW="1041480" imgH="685800" progId="Package">
+                  <p:embed/>
+                </p:oleObj>
+              </mc:Choice>
+              <mc:Fallback>
+                <p:oleObj name="Packager Shell Object" showAsIcon="1" r:id="rId3" imgW="1041480" imgH="685800" progId="Package">
+                  <p:embed/>
+                  <p:pic>
+                    <p:nvPicPr>
+                      <p:cNvPr id="0" name=""/>
+                      <p:cNvPicPr/>
+                      <p:nvPr/>
+                    </p:nvPicPr>
+                    <p:blipFill>
+                      <a:blip r:embed="rId4"/>
+                      <a:stretch>
+                        <a:fillRect/>
+                      </a:stretch>
+                    </p:blipFill>
+                    <p:spPr>
+                      <a:xfrm>
+                        <a:off x="7983538" y="5384800"/>
+                        <a:ext cx="1041400" cy="685800"/>
+                      </a:xfrm>
+                      <a:prstGeom prst="rect">
+                        <a:avLst/>
+                      </a:prstGeom>
+                    </p:spPr>
+                  </p:pic>
+                </p:oleObj>
+              </mc:Fallback>
+            </mc:AlternateContent>
+          </a:graphicData>
+        </a:graphic>
+      </p:graphicFrame>
+    </p:spTree>
+    <p:extLst>
+      <p:ext uri="{BB962C8B-B14F-4D97-AF65-F5344CB8AC3E}">
+        <p14:creationId xmlns:p14="http://schemas.microsoft.com/office/powerpoint/2010/main" val="2500480810"/>
+      </p:ext>
+    </p:extLst>
+  </p:cSld>
+  <p:clrMapOvr>
+    <a:masterClrMapping/>
+  </p:clrMapOvr>
+  <p:timing>
+    <p:tnLst>
+      <p:par>
+        <p:cTn id="1" dur="indefinite" restart="never" nodeType="tmRoot"/>
+      </p:par>
+    </p:tnLst>
+  </p:timing>
+</p:sld>
+</file>
+
+<file path=ppt/slides/slide12.xml><?xml version="1.0" encoding="utf-8"?>
+<p:sld xmlns:a="http://schemas.openxmlformats.org/drawingml/2006/main" xmlns:r="http://schemas.openxmlformats.org/officeDocument/2006/relationships" xmlns:p="http://schemas.openxmlformats.org/presentationml/2006/main">
+  <p:cSld>
+    <p:spTree>
+      <p:nvGrpSpPr>
+        <p:cNvPr id="1" name=""/>
+        <p:cNvGrpSpPr/>
+        <p:nvPr/>
+      </p:nvGrpSpPr>
+      <p:grpSpPr>
+        <a:xfrm>
+          <a:off x="0" y="0"/>
+          <a:ext cx="0" cy="0"/>
+          <a:chOff x="0" y="0"/>
+          <a:chExt cx="0" cy="0"/>
+        </a:xfrm>
+      </p:grpSpPr>
+      <p:sp>
+        <p:nvSpPr>
+          <p:cNvPr id="2" name="Title 1"/>
+          <p:cNvSpPr>
+            <a:spLocks noGrp="1"/>
+          </p:cNvSpPr>
+          <p:nvPr>
+            <p:ph type="title"/>
+          </p:nvPr>
+        </p:nvSpPr>
+        <p:spPr/>
+        <p:txBody>
+          <a:bodyPr/>
+          <a:lstStyle/>
+          <a:p>
+            <a:r>
+              <a:rPr lang="en-GB" dirty="0" smtClean="0"/>
+              <a:t>GIT Setup – .</a:t>
             </a:r>
             <a:r>
               <a:rPr lang="en-GB" dirty="0" err="1" smtClean="0"/>
@@ -4328,7 +5031,7 @@
 </p:sld>
 </file>
 
-<file path=ppt/slides/slide12.xml><?xml version="1.0" encoding="utf-8"?>
+<file path=ppt/slides/slide13.xml><?xml version="1.0" encoding="utf-8"?>
 <p:sld xmlns:a="http://schemas.openxmlformats.org/drawingml/2006/main" xmlns:r="http://schemas.openxmlformats.org/officeDocument/2006/relationships" xmlns:p="http://schemas.openxmlformats.org/presentationml/2006/main">
   <p:cSld>
     <p:spTree>

</xml_diff>